<commit_message>
summary lecture day 1
</commit_message>
<xml_diff>
--- a/episodes/extra_materials/image_processing_summary_day1_v1.pptx
+++ b/episodes/extra_materials/image_processing_summary_day1_v1.pptx
@@ -210,7 +210,7 @@
           </a:lstStyle>
           <a:p>
             <a:fld id="{8E519FCE-A50F-4DED-9A71-13FE2E53726C}" type="datetimeFigureOut">
-              <a:t>2/7/2023</a:t>
+              <a:t>29/02/2024</a:t>
             </a:fld>
             <a:endParaRPr lang="en-US"/>
           </a:p>
@@ -571,7 +571,7 @@
               <a:rPr lang="nl-NL" sz="1400" b="0" strike="noStrike" spc="-1">
                 <a:latin typeface="Times New Roman"/>
               </a:rPr>
-              <a:t>2</a:t>
+              <a:t>1</a:t>
             </a:fld>
             <a:endParaRPr lang="nl-NL" sz="1400" b="0" strike="noStrike" spc="-1">
               <a:latin typeface="Times New Roman"/>
@@ -723,7 +723,7 @@
           <a:p>
             <a:fld id="{846CE7D5-CF57-46EF-B807-FDD0502418D4}" type="datetimeFigureOut">
               <a:rPr lang="en-US" smtClean="0"/>
-              <a:t>2/7/2023</a:t>
+              <a:t>2/29/2024</a:t>
             </a:fld>
             <a:endParaRPr lang="en-US"/>
           </a:p>
@@ -893,7 +893,7 @@
           <a:p>
             <a:fld id="{846CE7D5-CF57-46EF-B807-FDD0502418D4}" type="datetimeFigureOut">
               <a:rPr lang="en-US" smtClean="0"/>
-              <a:t>2/7/2023</a:t>
+              <a:t>2/29/2024</a:t>
             </a:fld>
             <a:endParaRPr lang="en-US"/>
           </a:p>
@@ -1073,7 +1073,7 @@
           <a:p>
             <a:fld id="{846CE7D5-CF57-46EF-B807-FDD0502418D4}" type="datetimeFigureOut">
               <a:rPr lang="en-US" smtClean="0"/>
-              <a:t>2/7/2023</a:t>
+              <a:t>2/29/2024</a:t>
             </a:fld>
             <a:endParaRPr lang="en-US"/>
           </a:p>
@@ -2558,7 +2558,7 @@
           <a:p>
             <a:fld id="{846CE7D5-CF57-46EF-B807-FDD0502418D4}" type="datetimeFigureOut">
               <a:rPr lang="en-US" smtClean="0"/>
-              <a:t>2/7/2023</a:t>
+              <a:t>2/29/2024</a:t>
             </a:fld>
             <a:endParaRPr lang="en-US"/>
           </a:p>
@@ -3809,7 +3809,7 @@
           <a:p>
             <a:fld id="{EA730EFB-AB28-4A68-9CF2-24FEA7CF3D98}" type="datetimeFigureOut">
               <a:rPr lang="en-US" smtClean="0"/>
-              <a:t>2/7/2023</a:t>
+              <a:t>2/29/2024</a:t>
             </a:fld>
             <a:endParaRPr lang="en-US"/>
           </a:p>
@@ -4797,7 +4797,7 @@
           <a:p>
             <a:fld id="{846CE7D5-CF57-46EF-B807-FDD0502418D4}" type="datetimeFigureOut">
               <a:rPr lang="en-US" smtClean="0"/>
-              <a:t>2/7/2023</a:t>
+              <a:t>2/29/2024</a:t>
             </a:fld>
             <a:endParaRPr lang="en-US"/>
           </a:p>
@@ -6639,7 +6639,7 @@
           <a:p>
             <a:fld id="{846CE7D5-CF57-46EF-B807-FDD0502418D4}" type="datetimeFigureOut">
               <a:rPr lang="en-US" smtClean="0"/>
-              <a:t>2/7/2023</a:t>
+              <a:t>2/29/2024</a:t>
             </a:fld>
             <a:endParaRPr lang="en-US"/>
           </a:p>
@@ -7006,7 +7006,7 @@
           <a:p>
             <a:fld id="{846CE7D5-CF57-46EF-B807-FDD0502418D4}" type="datetimeFigureOut">
               <a:rPr lang="en-US" smtClean="0"/>
-              <a:t>2/7/2023</a:t>
+              <a:t>2/29/2024</a:t>
             </a:fld>
             <a:endParaRPr lang="en-US"/>
           </a:p>
@@ -7124,7 +7124,7 @@
           <a:p>
             <a:fld id="{846CE7D5-CF57-46EF-B807-FDD0502418D4}" type="datetimeFigureOut">
               <a:rPr lang="en-US" smtClean="0"/>
-              <a:t>2/7/2023</a:t>
+              <a:t>2/29/2024</a:t>
             </a:fld>
             <a:endParaRPr lang="en-US"/>
           </a:p>
@@ -7219,7 +7219,7 @@
           <a:p>
             <a:fld id="{846CE7D5-CF57-46EF-B807-FDD0502418D4}" type="datetimeFigureOut">
               <a:rPr lang="en-US" smtClean="0"/>
-              <a:t>2/7/2023</a:t>
+              <a:t>2/29/2024</a:t>
             </a:fld>
             <a:endParaRPr lang="en-US"/>
           </a:p>
@@ -7496,7 +7496,7 @@
           <a:p>
             <a:fld id="{846CE7D5-CF57-46EF-B807-FDD0502418D4}" type="datetimeFigureOut">
               <a:rPr lang="en-US" smtClean="0"/>
-              <a:t>2/7/2023</a:t>
+              <a:t>2/29/2024</a:t>
             </a:fld>
             <a:endParaRPr lang="en-US"/>
           </a:p>
@@ -7753,7 +7753,7 @@
           <a:p>
             <a:fld id="{846CE7D5-CF57-46EF-B807-FDD0502418D4}" type="datetimeFigureOut">
               <a:rPr lang="en-US" smtClean="0"/>
-              <a:t>2/7/2023</a:t>
+              <a:t>2/29/2024</a:t>
             </a:fld>
             <a:endParaRPr lang="en-US"/>
           </a:p>
@@ -7966,7 +7966,7 @@
           <a:p>
             <a:fld id="{846CE7D5-CF57-46EF-B807-FDD0502418D4}" type="datetimeFigureOut">
               <a:rPr lang="en-US" smtClean="0"/>
-              <a:t>2/7/2023</a:t>
+              <a:t>2/29/2024</a:t>
             </a:fld>
             <a:endParaRPr lang="en-US"/>
           </a:p>
@@ -9925,13 +9925,13 @@
               <a:rPr lang="nl-NL" sz="2400" spc="-1" dirty="0">
                 <a:latin typeface="Assistant"/>
               </a:rPr>
-              <a:t>Dr. Dani </a:t>
+              <a:t>Dr. Thijs </a:t>
             </a:r>
             <a:r>
               <a:rPr lang="nl-NL" sz="2400" spc="-1" dirty="0" err="1">
                 <a:latin typeface="Assistant"/>
               </a:rPr>
-              <a:t>Bodor</a:t>
+              <a:t>Vroegh</a:t>
             </a:r>
             <a:r>
               <a:rPr lang="nl-NL" sz="2400" spc="-1" dirty="0">
@@ -9953,16 +9953,22 @@
               </a:tabLst>
             </a:pPr>
             <a:r>
+              <a:rPr lang="nl-NL" sz="2400" spc="-1" dirty="0">
+                <a:latin typeface="Assistant"/>
+              </a:rPr>
+              <a:t>Jaro </a:t>
+            </a:r>
+            <a:r>
               <a:rPr lang="nl-NL" sz="2400" spc="-1" dirty="0" err="1">
                 <a:latin typeface="Assistant"/>
               </a:rPr>
-              <a:t>Djura</a:t>
+              <a:t>Camphuijsen</a:t>
             </a:r>
             <a:r>
               <a:rPr lang="nl-NL" sz="2400" spc="-1" dirty="0">
                 <a:latin typeface="Assistant"/>
               </a:rPr>
-              <a:t> Smits, MS</a:t>
+              <a:t>, MSc</a:t>
             </a:r>
             <a:endParaRPr lang="nl-NL" sz="2400" b="0" strike="noStrike" spc="-1" dirty="0">
               <a:latin typeface="Assistant"/>
@@ -10037,7 +10043,7 @@
                 <a:tab pos="0" algn="l"/>
               </a:tabLst>
             </a:pPr>
-            <a:endParaRPr lang="nl-NL" sz="2400" spc="-1">
+            <a:endParaRPr lang="nl-NL" sz="2400" spc="-1" dirty="0">
               <a:latin typeface="Arial"/>
             </a:endParaRPr>
           </a:p>
@@ -10053,7 +10059,7 @@
                 <a:tab pos="0" algn="l"/>
               </a:tabLst>
             </a:pPr>
-            <a:endParaRPr lang="nl-NL" sz="2400" spc="-1">
+            <a:endParaRPr lang="nl-NL" sz="2400" spc="-1" dirty="0">
               <a:latin typeface="Arial"/>
             </a:endParaRPr>
           </a:p>

</xml_diff>

<commit_message>
update day 2 lectures
</commit_message>
<xml_diff>
--- a/episodes/extra_materials/image_processing_summary_day1_v1.pptx
+++ b/episodes/extra_materials/image_processing_summary_day1_v1.pptx
@@ -7,7 +7,7 @@
     <p:sldMasterId id="2147483752" r:id="rId3"/>
   </p:sldMasterIdLst>
   <p:notesMasterIdLst>
-    <p:notesMasterId r:id="rId9"/>
+    <p:notesMasterId r:id="rId10"/>
   </p:notesMasterIdLst>
   <p:sldIdLst>
     <p:sldId id="260" r:id="rId4"/>
@@ -15,6 +15,7 @@
     <p:sldId id="258" r:id="rId6"/>
     <p:sldId id="262" r:id="rId7"/>
     <p:sldId id="263" r:id="rId8"/>
+    <p:sldId id="277" r:id="rId9"/>
   </p:sldIdLst>
   <p:sldSz cx="12192000" cy="6858000"/>
   <p:notesSz cx="6858000" cy="9144000"/>
@@ -210,7 +211,7 @@
           </a:lstStyle>
           <a:p>
             <a:fld id="{8E519FCE-A50F-4DED-9A71-13FE2E53726C}" type="datetimeFigureOut">
-              <a:t>29/02/2024</a:t>
+              <a:t>11/03/2024</a:t>
             </a:fld>
             <a:endParaRPr lang="en-US"/>
           </a:p>
@@ -723,7 +724,7 @@
           <a:p>
             <a:fld id="{846CE7D5-CF57-46EF-B807-FDD0502418D4}" type="datetimeFigureOut">
               <a:rPr lang="en-US" smtClean="0"/>
-              <a:t>2/29/2024</a:t>
+              <a:t>3/11/2024</a:t>
             </a:fld>
             <a:endParaRPr lang="en-US"/>
           </a:p>
@@ -893,7 +894,7 @@
           <a:p>
             <a:fld id="{846CE7D5-CF57-46EF-B807-FDD0502418D4}" type="datetimeFigureOut">
               <a:rPr lang="en-US" smtClean="0"/>
-              <a:t>2/29/2024</a:t>
+              <a:t>3/11/2024</a:t>
             </a:fld>
             <a:endParaRPr lang="en-US"/>
           </a:p>
@@ -1073,7 +1074,7 @@
           <a:p>
             <a:fld id="{846CE7D5-CF57-46EF-B807-FDD0502418D4}" type="datetimeFigureOut">
               <a:rPr lang="en-US" smtClean="0"/>
-              <a:t>2/29/2024</a:t>
+              <a:t>3/11/2024</a:t>
             </a:fld>
             <a:endParaRPr lang="en-US"/>
           </a:p>
@@ -2558,7 +2559,7 @@
           <a:p>
             <a:fld id="{846CE7D5-CF57-46EF-B807-FDD0502418D4}" type="datetimeFigureOut">
               <a:rPr lang="en-US" smtClean="0"/>
-              <a:t>2/29/2024</a:t>
+              <a:t>3/11/2024</a:t>
             </a:fld>
             <a:endParaRPr lang="en-US"/>
           </a:p>
@@ -3809,7 +3810,7 @@
           <a:p>
             <a:fld id="{EA730EFB-AB28-4A68-9CF2-24FEA7CF3D98}" type="datetimeFigureOut">
               <a:rPr lang="en-US" smtClean="0"/>
-              <a:t>2/29/2024</a:t>
+              <a:t>3/11/2024</a:t>
             </a:fld>
             <a:endParaRPr lang="en-US"/>
           </a:p>
@@ -4797,7 +4798,7 @@
           <a:p>
             <a:fld id="{846CE7D5-CF57-46EF-B807-FDD0502418D4}" type="datetimeFigureOut">
               <a:rPr lang="en-US" smtClean="0"/>
-              <a:t>2/29/2024</a:t>
+              <a:t>3/11/2024</a:t>
             </a:fld>
             <a:endParaRPr lang="en-US"/>
           </a:p>
@@ -6639,7 +6640,7 @@
           <a:p>
             <a:fld id="{846CE7D5-CF57-46EF-B807-FDD0502418D4}" type="datetimeFigureOut">
               <a:rPr lang="en-US" smtClean="0"/>
-              <a:t>2/29/2024</a:t>
+              <a:t>3/11/2024</a:t>
             </a:fld>
             <a:endParaRPr lang="en-US"/>
           </a:p>
@@ -7006,7 +7007,7 @@
           <a:p>
             <a:fld id="{846CE7D5-CF57-46EF-B807-FDD0502418D4}" type="datetimeFigureOut">
               <a:rPr lang="en-US" smtClean="0"/>
-              <a:t>2/29/2024</a:t>
+              <a:t>3/11/2024</a:t>
             </a:fld>
             <a:endParaRPr lang="en-US"/>
           </a:p>
@@ -7124,7 +7125,7 @@
           <a:p>
             <a:fld id="{846CE7D5-CF57-46EF-B807-FDD0502418D4}" type="datetimeFigureOut">
               <a:rPr lang="en-US" smtClean="0"/>
-              <a:t>2/29/2024</a:t>
+              <a:t>3/11/2024</a:t>
             </a:fld>
             <a:endParaRPr lang="en-US"/>
           </a:p>
@@ -7219,7 +7220,7 @@
           <a:p>
             <a:fld id="{846CE7D5-CF57-46EF-B807-FDD0502418D4}" type="datetimeFigureOut">
               <a:rPr lang="en-US" smtClean="0"/>
-              <a:t>2/29/2024</a:t>
+              <a:t>3/11/2024</a:t>
             </a:fld>
             <a:endParaRPr lang="en-US"/>
           </a:p>
@@ -7496,7 +7497,7 @@
           <a:p>
             <a:fld id="{846CE7D5-CF57-46EF-B807-FDD0502418D4}" type="datetimeFigureOut">
               <a:rPr lang="en-US" smtClean="0"/>
-              <a:t>2/29/2024</a:t>
+              <a:t>3/11/2024</a:t>
             </a:fld>
             <a:endParaRPr lang="en-US"/>
           </a:p>
@@ -7753,7 +7754,7 @@
           <a:p>
             <a:fld id="{846CE7D5-CF57-46EF-B807-FDD0502418D4}" type="datetimeFigureOut">
               <a:rPr lang="en-US" smtClean="0"/>
-              <a:t>2/29/2024</a:t>
+              <a:t>3/11/2024</a:t>
             </a:fld>
             <a:endParaRPr lang="en-US"/>
           </a:p>
@@ -7966,7 +7967,7 @@
           <a:p>
             <a:fld id="{846CE7D5-CF57-46EF-B807-FDD0502418D4}" type="datetimeFigureOut">
               <a:rPr lang="en-US" smtClean="0"/>
-              <a:t>2/29/2024</a:t>
+              <a:t>3/11/2024</a:t>
             </a:fld>
             <a:endParaRPr lang="en-US"/>
           </a:p>
@@ -9805,7 +9806,7 @@
                 <a:latin typeface="Nunito"/>
                 <a:cs typeface="Arial"/>
               </a:rPr>
-              <a:t>Day 1 summary</a:t>
+              <a:t>Day 1+ summary</a:t>
             </a:r>
             <a:endParaRPr lang="en-US" sz="4000" b="1" strike="noStrike" spc="-1" dirty="0">
               <a:solidFill>
@@ -11942,6 +11943,1083 @@
   <p:clrMapOvr>
     <a:masterClrMapping/>
   </p:clrMapOvr>
+</p:sld>
+</file>
+
+<file path=ppt/slides/slide6.xml><?xml version="1.0" encoding="utf-8"?>
+<p:sld xmlns:a="http://schemas.openxmlformats.org/drawingml/2006/main" xmlns:r="http://schemas.openxmlformats.org/officeDocument/2006/relationships" xmlns:p="http://schemas.openxmlformats.org/presentationml/2006/main">
+  <p:cSld>
+    <p:spTree>
+      <p:nvGrpSpPr>
+        <p:cNvPr id="1" name=""/>
+        <p:cNvGrpSpPr/>
+        <p:nvPr/>
+      </p:nvGrpSpPr>
+      <p:grpSpPr>
+        <a:xfrm>
+          <a:off x="0" y="0"/>
+          <a:ext cx="0" cy="0"/>
+          <a:chOff x="0" y="0"/>
+          <a:chExt cx="0" cy="0"/>
+        </a:xfrm>
+      </p:grpSpPr>
+      <p:sp>
+        <p:nvSpPr>
+          <p:cNvPr id="3" name="TextBox 1">
+            <a:extLst>
+              <a:ext uri="{FF2B5EF4-FFF2-40B4-BE49-F238E27FC236}">
+                <a16:creationId xmlns:a16="http://schemas.microsoft.com/office/drawing/2014/main" id="{B76E810A-7D89-CFF6-389E-860870EE3033}"/>
+              </a:ext>
+            </a:extLst>
+          </p:cNvPr>
+          <p:cNvSpPr txBox="1"/>
+          <p:nvPr/>
+        </p:nvSpPr>
+        <p:spPr>
+          <a:xfrm>
+            <a:off x="2386253" y="229227"/>
+            <a:ext cx="7769659" cy="1508105"/>
+          </a:xfrm>
+          <a:prstGeom prst="rect">
+            <a:avLst/>
+          </a:prstGeom>
+          <a:noFill/>
+        </p:spPr>
+        <p:txBody>
+          <a:bodyPr wrap="square" lIns="91440" tIns="45720" rIns="91440" bIns="45720" rtlCol="0" anchor="t">
+            <a:spAutoFit/>
+          </a:bodyPr>
+          <a:lstStyle>
+            <a:defPPr>
+              <a:defRPr lang="en-US"/>
+            </a:defPPr>
+            <a:lvl1pPr marL="0" algn="l" defTabSz="914400" rtl="0" eaLnBrk="1" latinLnBrk="0" hangingPunct="1">
+              <a:defRPr sz="1800" kern="1200">
+                <a:solidFill>
+                  <a:schemeClr val="tx1"/>
+                </a:solidFill>
+                <a:latin typeface="+mn-lt"/>
+                <a:ea typeface="+mn-ea"/>
+                <a:cs typeface="+mn-cs"/>
+              </a:defRPr>
+            </a:lvl1pPr>
+            <a:lvl2pPr marL="457200" algn="l" defTabSz="914400" rtl="0" eaLnBrk="1" latinLnBrk="0" hangingPunct="1">
+              <a:defRPr sz="1800" kern="1200">
+                <a:solidFill>
+                  <a:schemeClr val="tx1"/>
+                </a:solidFill>
+                <a:latin typeface="+mn-lt"/>
+                <a:ea typeface="+mn-ea"/>
+                <a:cs typeface="+mn-cs"/>
+              </a:defRPr>
+            </a:lvl2pPr>
+            <a:lvl3pPr marL="914400" algn="l" defTabSz="914400" rtl="0" eaLnBrk="1" latinLnBrk="0" hangingPunct="1">
+              <a:defRPr sz="1800" kern="1200">
+                <a:solidFill>
+                  <a:schemeClr val="tx1"/>
+                </a:solidFill>
+                <a:latin typeface="+mn-lt"/>
+                <a:ea typeface="+mn-ea"/>
+                <a:cs typeface="+mn-cs"/>
+              </a:defRPr>
+            </a:lvl3pPr>
+            <a:lvl4pPr marL="1371600" algn="l" defTabSz="914400" rtl="0" eaLnBrk="1" latinLnBrk="0" hangingPunct="1">
+              <a:defRPr sz="1800" kern="1200">
+                <a:solidFill>
+                  <a:schemeClr val="tx1"/>
+                </a:solidFill>
+                <a:latin typeface="+mn-lt"/>
+                <a:ea typeface="+mn-ea"/>
+                <a:cs typeface="+mn-cs"/>
+              </a:defRPr>
+            </a:lvl4pPr>
+            <a:lvl5pPr marL="1828800" algn="l" defTabSz="914400" rtl="0" eaLnBrk="1" latinLnBrk="0" hangingPunct="1">
+              <a:defRPr sz="1800" kern="1200">
+                <a:solidFill>
+                  <a:schemeClr val="tx1"/>
+                </a:solidFill>
+                <a:latin typeface="+mn-lt"/>
+                <a:ea typeface="+mn-ea"/>
+                <a:cs typeface="+mn-cs"/>
+              </a:defRPr>
+            </a:lvl5pPr>
+            <a:lvl6pPr marL="2286000" algn="l" defTabSz="914400" rtl="0" eaLnBrk="1" latinLnBrk="0" hangingPunct="1">
+              <a:defRPr sz="1800" kern="1200">
+                <a:solidFill>
+                  <a:schemeClr val="tx1"/>
+                </a:solidFill>
+                <a:latin typeface="+mn-lt"/>
+                <a:ea typeface="+mn-ea"/>
+                <a:cs typeface="+mn-cs"/>
+              </a:defRPr>
+            </a:lvl6pPr>
+            <a:lvl7pPr marL="2743200" algn="l" defTabSz="914400" rtl="0" eaLnBrk="1" latinLnBrk="0" hangingPunct="1">
+              <a:defRPr sz="1800" kern="1200">
+                <a:solidFill>
+                  <a:schemeClr val="tx1"/>
+                </a:solidFill>
+                <a:latin typeface="+mn-lt"/>
+                <a:ea typeface="+mn-ea"/>
+                <a:cs typeface="+mn-cs"/>
+              </a:defRPr>
+            </a:lvl7pPr>
+            <a:lvl8pPr marL="3200400" algn="l" defTabSz="914400" rtl="0" eaLnBrk="1" latinLnBrk="0" hangingPunct="1">
+              <a:defRPr sz="1800" kern="1200">
+                <a:solidFill>
+                  <a:schemeClr val="tx1"/>
+                </a:solidFill>
+                <a:latin typeface="+mn-lt"/>
+                <a:ea typeface="+mn-ea"/>
+                <a:cs typeface="+mn-cs"/>
+              </a:defRPr>
+            </a:lvl8pPr>
+            <a:lvl9pPr marL="3657600" algn="l" defTabSz="914400" rtl="0" eaLnBrk="1" latinLnBrk="0" hangingPunct="1">
+              <a:defRPr sz="1800" kern="1200">
+                <a:solidFill>
+                  <a:schemeClr val="tx1"/>
+                </a:solidFill>
+                <a:latin typeface="+mn-lt"/>
+                <a:ea typeface="+mn-ea"/>
+                <a:cs typeface="+mn-cs"/>
+              </a:defRPr>
+            </a:lvl9pPr>
+          </a:lstStyle>
+          <a:p>
+            <a:r>
+              <a:rPr lang="en-US" sz="3200" b="1" dirty="0">
+                <a:solidFill>
+                  <a:srgbClr val="7030A0"/>
+                </a:solidFill>
+              </a:rPr>
+              <a:t>Image Processing in Python: Day 1+ summary</a:t>
+            </a:r>
+          </a:p>
+          <a:p>
+            <a:r>
+              <a:rPr lang="en-US" sz="2800" b="1" dirty="0">
+                <a:solidFill>
+                  <a:srgbClr val="00A0E1"/>
+                </a:solidFill>
+              </a:rPr>
+              <a:t>   </a:t>
+            </a:r>
+          </a:p>
+        </p:txBody>
+      </p:sp>
+      <p:sp>
+        <p:nvSpPr>
+          <p:cNvPr id="6" name="TextBox 5">
+            <a:extLst>
+              <a:ext uri="{FF2B5EF4-FFF2-40B4-BE49-F238E27FC236}">
+                <a16:creationId xmlns:a16="http://schemas.microsoft.com/office/drawing/2014/main" id="{06A4B648-05BE-03EB-D1AD-5BD4B922EF2D}"/>
+              </a:ext>
+            </a:extLst>
+          </p:cNvPr>
+          <p:cNvSpPr txBox="1"/>
+          <p:nvPr/>
+        </p:nvSpPr>
+        <p:spPr>
+          <a:xfrm>
+            <a:off x="1518047" y="4929187"/>
+            <a:ext cx="7878363" cy="461665"/>
+          </a:xfrm>
+          <a:prstGeom prst="rect">
+            <a:avLst/>
+          </a:prstGeom>
+          <a:noFill/>
+        </p:spPr>
+        <p:txBody>
+          <a:bodyPr rot="0" spcFirstLastPara="0" vertOverflow="overflow" horzOverflow="overflow" vert="horz" wrap="square" lIns="91440" tIns="45720" rIns="91440" bIns="45720" numCol="1" spcCol="0" rtlCol="0" fromWordArt="0" anchor="t" anchorCtr="0" forceAA="0" compatLnSpc="1">
+            <a:prstTxWarp prst="textNoShape">
+              <a:avLst/>
+            </a:prstTxWarp>
+            <a:spAutoFit/>
+          </a:bodyPr>
+          <a:lstStyle/>
+          <a:p>
+            <a:pPr rtl="0"/>
+            <a:endParaRPr lang="en-US" sz="2400">
+              <a:cs typeface="Segoe UI"/>
+            </a:endParaRPr>
+          </a:p>
+        </p:txBody>
+      </p:sp>
+      <p:sp>
+        <p:nvSpPr>
+          <p:cNvPr id="5" name="TextBox 4">
+            <a:extLst>
+              <a:ext uri="{FF2B5EF4-FFF2-40B4-BE49-F238E27FC236}">
+                <a16:creationId xmlns:a16="http://schemas.microsoft.com/office/drawing/2014/main" id="{6D7FD12A-CCA3-E1B4-9E11-43BE6C81C72F}"/>
+              </a:ext>
+            </a:extLst>
+          </p:cNvPr>
+          <p:cNvSpPr txBox="1"/>
+          <p:nvPr/>
+        </p:nvSpPr>
+        <p:spPr>
+          <a:xfrm>
+            <a:off x="3302000" y="3211286"/>
+            <a:ext cx="2797627" cy="1200329"/>
+          </a:xfrm>
+          <a:prstGeom prst="rect">
+            <a:avLst/>
+          </a:prstGeom>
+          <a:noFill/>
+        </p:spPr>
+        <p:txBody>
+          <a:bodyPr rot="0" spcFirstLastPara="0" vertOverflow="overflow" horzOverflow="overflow" vert="horz" wrap="square" lIns="91440" tIns="45720" rIns="91440" bIns="45720" numCol="1" spcCol="0" rtlCol="0" fromWordArt="0" anchor="t" anchorCtr="0" forceAA="0" compatLnSpc="1">
+            <a:prstTxWarp prst="textNoShape">
+              <a:avLst/>
+            </a:prstTxWarp>
+            <a:spAutoFit/>
+          </a:bodyPr>
+          <a:lstStyle/>
+          <a:p>
+            <a:r>
+              <a:rPr lang="en-US" u="sng">
+                <a:solidFill>
+                  <a:schemeClr val="accent2">
+                    <a:lumMod val="90000"/>
+                    <a:lumOff val="10000"/>
+                  </a:schemeClr>
+                </a:solidFill>
+              </a:rPr>
+              <a:t>Can be either:</a:t>
+            </a:r>
+          </a:p>
+          <a:p>
+            <a:endParaRPr lang="en-US">
+              <a:solidFill>
+                <a:schemeClr val="accent2">
+                  <a:lumMod val="90000"/>
+                  <a:lumOff val="10000"/>
+                </a:schemeClr>
+              </a:solidFill>
+            </a:endParaRPr>
+          </a:p>
+          <a:p>
+            <a:r>
+              <a:rPr lang="en-US">
+                <a:solidFill>
+                  <a:schemeClr val="accent2">
+                    <a:lumMod val="90000"/>
+                    <a:lumOff val="10000"/>
+                  </a:schemeClr>
+                </a:solidFill>
+              </a:rPr>
+              <a:t>TIFF</a:t>
+            </a:r>
+          </a:p>
+          <a:p>
+            <a:r>
+              <a:rPr lang="en-US">
+                <a:solidFill>
+                  <a:schemeClr val="accent2">
+                    <a:lumMod val="90000"/>
+                    <a:lumOff val="10000"/>
+                  </a:schemeClr>
+                </a:solidFill>
+              </a:rPr>
+              <a:t>MNG</a:t>
+            </a:r>
+          </a:p>
+        </p:txBody>
+      </p:sp>
+      <p:graphicFrame>
+        <p:nvGraphicFramePr>
+          <p:cNvPr id="9" name="Table 8">
+            <a:extLst>
+              <a:ext uri="{FF2B5EF4-FFF2-40B4-BE49-F238E27FC236}">
+                <a16:creationId xmlns:a16="http://schemas.microsoft.com/office/drawing/2014/main" id="{2FA84C54-593B-4849-E351-16E18465C619}"/>
+              </a:ext>
+            </a:extLst>
+          </p:cNvPr>
+          <p:cNvGraphicFramePr>
+            <a:graphicFrameLocks noGrp="1"/>
+          </p:cNvGraphicFramePr>
+          <p:nvPr>
+            <p:extLst>
+              <p:ext uri="{D42A27DB-BD31-4B8C-83A1-F6EECF244321}">
+                <p14:modId xmlns:p14="http://schemas.microsoft.com/office/powerpoint/2010/main" val="3273887691"/>
+              </p:ext>
+            </p:extLst>
+          </p:nvPr>
+        </p:nvGraphicFramePr>
+        <p:xfrm>
+          <a:off x="2875004" y="1479732"/>
+          <a:ext cx="8886100" cy="5151120"/>
+        </p:xfrm>
+        <a:graphic>
+          <a:graphicData uri="http://schemas.openxmlformats.org/drawingml/2006/table">
+            <a:tbl>
+              <a:tblPr firstRow="1" bandRow="1">
+                <a:tableStyleId>{5C22544A-7EE6-4342-B048-85BDC9FD1C3A}</a:tableStyleId>
+              </a:tblPr>
+              <a:tblGrid>
+                <a:gridCol w="1777220">
+                  <a:extLst>
+                    <a:ext uri="{9D8B030D-6E8A-4147-A177-3AD203B41FA5}">
+                      <a16:colId xmlns:a16="http://schemas.microsoft.com/office/drawing/2014/main" val="3374309221"/>
+                    </a:ext>
+                  </a:extLst>
+                </a:gridCol>
+                <a:gridCol w="1777220">
+                  <a:extLst>
+                    <a:ext uri="{9D8B030D-6E8A-4147-A177-3AD203B41FA5}">
+                      <a16:colId xmlns:a16="http://schemas.microsoft.com/office/drawing/2014/main" val="3147185719"/>
+                    </a:ext>
+                  </a:extLst>
+                </a:gridCol>
+                <a:gridCol w="1777220">
+                  <a:extLst>
+                    <a:ext uri="{9D8B030D-6E8A-4147-A177-3AD203B41FA5}">
+                      <a16:colId xmlns:a16="http://schemas.microsoft.com/office/drawing/2014/main" val="1021252587"/>
+                    </a:ext>
+                  </a:extLst>
+                </a:gridCol>
+                <a:gridCol w="1777220">
+                  <a:extLst>
+                    <a:ext uri="{9D8B030D-6E8A-4147-A177-3AD203B41FA5}">
+                      <a16:colId xmlns:a16="http://schemas.microsoft.com/office/drawing/2014/main" val="2467608469"/>
+                    </a:ext>
+                  </a:extLst>
+                </a:gridCol>
+                <a:gridCol w="1777220">
+                  <a:extLst>
+                    <a:ext uri="{9D8B030D-6E8A-4147-A177-3AD203B41FA5}">
+                      <a16:colId xmlns:a16="http://schemas.microsoft.com/office/drawing/2014/main" val="1923040961"/>
+                    </a:ext>
+                  </a:extLst>
+                </a:gridCol>
+              </a:tblGrid>
+              <a:tr h="399168">
+                <a:tc>
+                  <a:txBody>
+                    <a:bodyPr/>
+                    <a:lstStyle/>
+                    <a:p>
+                      <a:pPr algn="l" fontAlgn="b"/>
+                      <a:r>
+                        <a:rPr lang="en-US" dirty="0">
+                          <a:effectLst/>
+                        </a:rPr>
+                        <a:t>Format </a:t>
+                      </a:r>
+                      <a:r>
+                        <a:rPr lang="en-US" dirty="0">
+                          <a:solidFill>
+                            <a:schemeClr val="accent3">
+                              <a:lumMod val="75000"/>
+                            </a:schemeClr>
+                          </a:solidFill>
+                          <a:effectLst/>
+                        </a:rPr>
+                        <a:t>family</a:t>
+                      </a:r>
+                    </a:p>
+                  </a:txBody>
+                  <a:tcPr marL="76200" marR="76200" marT="76200" marB="76200" anchor="b"/>
+                </a:tc>
+                <a:tc>
+                  <a:txBody>
+                    <a:bodyPr/>
+                    <a:lstStyle/>
+                    <a:p>
+                      <a:pPr algn="l" fontAlgn="b"/>
+                      <a:r>
+                        <a:rPr lang="en-US" dirty="0">
+                          <a:effectLst/>
+                        </a:rPr>
+                        <a:t>Compression</a:t>
+                      </a:r>
+                    </a:p>
+                  </a:txBody>
+                  <a:tcPr marL="76200" marR="76200" marT="76200" marB="76200" anchor="b"/>
+                </a:tc>
+                <a:tc>
+                  <a:txBody>
+                    <a:bodyPr/>
+                    <a:lstStyle/>
+                    <a:p>
+                      <a:pPr algn="l" fontAlgn="b"/>
+                      <a:r>
+                        <a:rPr lang="en-US" dirty="0">
+                          <a:effectLst/>
+                        </a:rPr>
+                        <a:t>Metadata</a:t>
+                      </a:r>
+                    </a:p>
+                  </a:txBody>
+                  <a:tcPr marL="76200" marR="76200" marT="76200" marB="76200" anchor="b"/>
+                </a:tc>
+                <a:tc>
+                  <a:txBody>
+                    <a:bodyPr/>
+                    <a:lstStyle/>
+                    <a:p>
+                      <a:pPr algn="l" fontAlgn="b"/>
+                      <a:r>
+                        <a:rPr lang="en-US" dirty="0">
+                          <a:effectLst/>
+                        </a:rPr>
+                        <a:t>Advantages</a:t>
+                      </a:r>
+                    </a:p>
+                  </a:txBody>
+                  <a:tcPr marL="76200" marR="76200" marT="76200" marB="76200" anchor="b"/>
+                </a:tc>
+                <a:tc>
+                  <a:txBody>
+                    <a:bodyPr/>
+                    <a:lstStyle/>
+                    <a:p>
+                      <a:pPr algn="l" fontAlgn="b"/>
+                      <a:r>
+                        <a:rPr lang="en-US" dirty="0">
+                          <a:effectLst/>
+                        </a:rPr>
+                        <a:t>Disadvantages</a:t>
+                      </a:r>
+                    </a:p>
+                  </a:txBody>
+                  <a:tcPr marL="76200" marR="76200" marT="76200" marB="76200" anchor="b"/>
+                </a:tc>
+                <a:extLst>
+                  <a:ext uri="{0D108BD9-81ED-4DB2-BD59-A6C34878D82A}">
+                    <a16:rowId xmlns:a16="http://schemas.microsoft.com/office/drawing/2014/main" val="1206191995"/>
+                  </a:ext>
+                </a:extLst>
+              </a:tr>
+              <a:tr h="912384">
+                <a:tc>
+                  <a:txBody>
+                    <a:bodyPr/>
+                    <a:lstStyle/>
+                    <a:p>
+                      <a:pPr fontAlgn="t"/>
+                      <a:r>
+                        <a:rPr lang="en-US" dirty="0">
+                          <a:effectLst/>
+                        </a:rPr>
+                        <a:t>BMP</a:t>
+                      </a:r>
+                    </a:p>
+                  </a:txBody>
+                  <a:tcPr marL="76200" marR="76200" marT="76200" marB="76200"/>
+                </a:tc>
+                <a:tc>
+                  <a:txBody>
+                    <a:bodyPr/>
+                    <a:lstStyle/>
+                    <a:p>
+                      <a:pPr fontAlgn="t"/>
+                      <a:r>
+                        <a:rPr lang="en-US" dirty="0">
+                          <a:effectLst/>
+                        </a:rPr>
+                        <a:t>None * </a:t>
+                      </a:r>
+                      <a:r>
+                        <a:rPr lang="en-US" dirty="0">
+                          <a:solidFill>
+                            <a:schemeClr val="accent3">
+                              <a:lumMod val="75000"/>
+                            </a:schemeClr>
+                          </a:solidFill>
+                          <a:effectLst/>
+                        </a:rPr>
+                        <a:t>or </a:t>
+                      </a:r>
+                      <a:r>
+                        <a:rPr lang="en-US" dirty="0" err="1">
+                          <a:solidFill>
+                            <a:schemeClr val="accent3">
+                              <a:lumMod val="75000"/>
+                            </a:schemeClr>
+                          </a:solidFill>
+                          <a:effectLst/>
+                        </a:rPr>
+                        <a:t>lzw</a:t>
+                      </a:r>
+                      <a:r>
+                        <a:rPr lang="en-US" dirty="0">
+                          <a:solidFill>
+                            <a:schemeClr val="accent3">
+                              <a:lumMod val="75000"/>
+                            </a:schemeClr>
+                          </a:solidFill>
+                          <a:effectLst/>
+                        </a:rPr>
+                        <a:t> compression</a:t>
+                      </a:r>
+                    </a:p>
+                  </a:txBody>
+                  <a:tcPr marL="76200" marR="76200" marT="76200" marB="76200"/>
+                </a:tc>
+                <a:tc>
+                  <a:txBody>
+                    <a:bodyPr/>
+                    <a:lstStyle/>
+                    <a:p>
+                      <a:pPr fontAlgn="t"/>
+                      <a:r>
+                        <a:rPr lang="en-US" dirty="0">
+                          <a:effectLst/>
+                        </a:rPr>
+                        <a:t>None </a:t>
+                      </a:r>
+                      <a:r>
+                        <a:rPr lang="en-US" dirty="0">
+                          <a:solidFill>
+                            <a:schemeClr val="accent3">
+                              <a:lumMod val="75000"/>
+                            </a:schemeClr>
+                          </a:solidFill>
+                          <a:effectLst/>
+                        </a:rPr>
+                        <a:t>* experts disagree</a:t>
+                      </a:r>
+                    </a:p>
+                  </a:txBody>
+                  <a:tcPr marL="76200" marR="76200" marT="76200" marB="76200"/>
+                </a:tc>
+                <a:tc>
+                  <a:txBody>
+                    <a:bodyPr/>
+                    <a:lstStyle/>
+                    <a:p>
+                      <a:pPr fontAlgn="t"/>
+                      <a:r>
+                        <a:rPr lang="en-US" dirty="0">
+                          <a:effectLst/>
+                        </a:rPr>
+                        <a:t>Universally viewable, </a:t>
+                      </a:r>
+                      <a:r>
+                        <a:rPr lang="en-US" sz="1800" b="0" i="0" u="none" strike="noStrike" noProof="0" dirty="0">
+                          <a:effectLst/>
+                          <a:latin typeface="Arial"/>
+                        </a:rPr>
+                        <a:t>high quality</a:t>
+                      </a:r>
+                      <a:endParaRPr lang="en-US" dirty="0">
+                        <a:effectLst/>
+                      </a:endParaRPr>
+                    </a:p>
+                  </a:txBody>
+                  <a:tcPr marL="76200" marR="76200" marT="76200" marB="76200"/>
+                </a:tc>
+                <a:tc>
+                  <a:txBody>
+                    <a:bodyPr/>
+                    <a:lstStyle/>
+                    <a:p>
+                      <a:pPr fontAlgn="t"/>
+                      <a:r>
+                        <a:rPr lang="en-US" dirty="0">
+                          <a:effectLst/>
+                        </a:rPr>
+                        <a:t>Large file sizes</a:t>
+                      </a:r>
+                    </a:p>
+                  </a:txBody>
+                  <a:tcPr marL="76200" marR="76200" marT="76200" marB="76200"/>
+                </a:tc>
+                <a:extLst>
+                  <a:ext uri="{0D108BD9-81ED-4DB2-BD59-A6C34878D82A}">
+                    <a16:rowId xmlns:a16="http://schemas.microsoft.com/office/drawing/2014/main" val="2836260002"/>
+                  </a:ext>
+                </a:extLst>
+              </a:tr>
+              <a:tr h="1425600">
+                <a:tc>
+                  <a:txBody>
+                    <a:bodyPr/>
+                    <a:lstStyle/>
+                    <a:p>
+                      <a:pPr fontAlgn="t"/>
+                      <a:r>
+                        <a:rPr lang="en-US" dirty="0">
+                          <a:effectLst/>
+                        </a:rPr>
+                        <a:t>JPEG</a:t>
+                      </a:r>
+                    </a:p>
+                  </a:txBody>
+                  <a:tcPr marL="76200" marR="76200" marT="76200" marB="76200"/>
+                </a:tc>
+                <a:tc>
+                  <a:txBody>
+                    <a:bodyPr/>
+                    <a:lstStyle/>
+                    <a:p>
+                      <a:pPr fontAlgn="t"/>
+                      <a:r>
+                        <a:rPr lang="en-US" dirty="0">
+                          <a:effectLst/>
+                        </a:rPr>
+                        <a:t>Lossy </a:t>
+                      </a:r>
+                      <a:r>
+                        <a:rPr lang="en-US" dirty="0">
+                          <a:solidFill>
+                            <a:schemeClr val="accent3">
+                              <a:lumMod val="75000"/>
+                            </a:schemeClr>
+                          </a:solidFill>
+                          <a:effectLst/>
+                        </a:rPr>
+                        <a:t>(except some notable exceptions like some JPEG2000)</a:t>
+                      </a:r>
+                    </a:p>
+                  </a:txBody>
+                  <a:tcPr marL="76200" marR="76200" marT="76200" marB="76200"/>
+                </a:tc>
+                <a:tc>
+                  <a:txBody>
+                    <a:bodyPr/>
+                    <a:lstStyle/>
+                    <a:p>
+                      <a:pPr fontAlgn="t"/>
+                      <a:r>
+                        <a:rPr lang="en-US" dirty="0">
+                          <a:effectLst/>
+                        </a:rPr>
+                        <a:t>Yes</a:t>
+                      </a:r>
+                    </a:p>
+                  </a:txBody>
+                  <a:tcPr marL="76200" marR="76200" marT="76200" marB="76200"/>
+                </a:tc>
+                <a:tc>
+                  <a:txBody>
+                    <a:bodyPr/>
+                    <a:lstStyle/>
+                    <a:p>
+                      <a:pPr fontAlgn="t"/>
+                      <a:r>
+                        <a:rPr lang="en-US" dirty="0">
+                          <a:effectLst/>
+                        </a:rPr>
+                        <a:t>Universally viewable, </a:t>
+                      </a:r>
+                      <a:r>
+                        <a:rPr lang="en-US" sz="1800" b="0" i="0" u="none" strike="noStrike" noProof="0" dirty="0">
+                          <a:effectLst/>
+                          <a:latin typeface="Arial"/>
+                        </a:rPr>
+                        <a:t>smaller file size</a:t>
+                      </a:r>
+                      <a:endParaRPr lang="en-US" dirty="0">
+                        <a:effectLst/>
+                      </a:endParaRPr>
+                    </a:p>
+                  </a:txBody>
+                  <a:tcPr marL="76200" marR="76200" marT="76200" marB="76200"/>
+                </a:tc>
+                <a:tc>
+                  <a:txBody>
+                    <a:bodyPr/>
+                    <a:lstStyle/>
+                    <a:p>
+                      <a:pPr fontAlgn="t"/>
+                      <a:r>
+                        <a:rPr lang="en-US" dirty="0">
+                          <a:effectLst/>
+                        </a:rPr>
+                        <a:t>Detail may be lost</a:t>
+                      </a:r>
+                    </a:p>
+                  </a:txBody>
+                  <a:tcPr marL="76200" marR="76200" marT="76200" marB="76200"/>
+                </a:tc>
+                <a:extLst>
+                  <a:ext uri="{0D108BD9-81ED-4DB2-BD59-A6C34878D82A}">
+                    <a16:rowId xmlns:a16="http://schemas.microsoft.com/office/drawing/2014/main" val="3993377606"/>
+                  </a:ext>
+                </a:extLst>
+              </a:tr>
+              <a:tr h="1168992">
+                <a:tc>
+                  <a:txBody>
+                    <a:bodyPr/>
+                    <a:lstStyle/>
+                    <a:p>
+                      <a:pPr fontAlgn="t"/>
+                      <a:r>
+                        <a:rPr lang="en-US" dirty="0">
+                          <a:effectLst/>
+                        </a:rPr>
+                        <a:t>PNG</a:t>
+                      </a:r>
+                    </a:p>
+                  </a:txBody>
+                  <a:tcPr marL="76200" marR="76200" marT="76200" marB="76200"/>
+                </a:tc>
+                <a:tc>
+                  <a:txBody>
+                    <a:bodyPr/>
+                    <a:lstStyle/>
+                    <a:p>
+                      <a:pPr fontAlgn="t"/>
+                      <a:r>
+                        <a:rPr lang="en-US" dirty="0">
+                          <a:effectLst/>
+                        </a:rPr>
+                        <a:t>Lossless</a:t>
+                      </a:r>
+                    </a:p>
+                  </a:txBody>
+                  <a:tcPr marL="76200" marR="76200" marT="76200" marB="76200"/>
+                </a:tc>
+                <a:tc>
+                  <a:txBody>
+                    <a:bodyPr/>
+                    <a:lstStyle/>
+                    <a:p>
+                      <a:pPr fontAlgn="t"/>
+                      <a:r>
+                        <a:rPr lang="en-US" dirty="0">
+                          <a:effectLst/>
+                        </a:rPr>
+                        <a:t>Yes</a:t>
+                      </a:r>
+                    </a:p>
+                  </a:txBody>
+                  <a:tcPr marL="76200" marR="76200" marT="76200" marB="76200"/>
+                </a:tc>
+                <a:tc>
+                  <a:txBody>
+                    <a:bodyPr/>
+                    <a:lstStyle/>
+                    <a:p>
+                      <a:pPr fontAlgn="t"/>
+                      <a:r>
+                        <a:rPr lang="en-US" dirty="0">
+                          <a:effectLst/>
+                        </a:rPr>
+                        <a:t>Universally viewable, </a:t>
+                      </a:r>
+                      <a:r>
+                        <a:rPr lang="en-US" dirty="0">
+                          <a:solidFill>
+                            <a:schemeClr val="accent1">
+                              <a:lumMod val="50000"/>
+                            </a:schemeClr>
+                          </a:solidFill>
+                          <a:effectLst/>
+                          <a:hlinkClick r:id="rId2">
+                            <a:extLst>
+                              <a:ext uri="{A12FA001-AC4F-418D-AE19-62706E023703}">
+                                <ahyp:hlinkClr xmlns:ahyp="http://schemas.microsoft.com/office/drawing/2018/hyperlinkcolor" val="tx"/>
+                              </a:ext>
+                            </a:extLst>
+                          </a:hlinkClick>
+                        </a:rPr>
+                        <a:t>open standard</a:t>
+                      </a:r>
+                      <a:r>
+                        <a:rPr lang="en-US" dirty="0">
+                          <a:effectLst/>
+                        </a:rPr>
+                        <a:t>, smaller file size</a:t>
+                      </a:r>
+                    </a:p>
+                  </a:txBody>
+                  <a:tcPr marL="76200" marR="76200" marT="76200" marB="76200"/>
+                </a:tc>
+                <a:tc>
+                  <a:txBody>
+                    <a:bodyPr/>
+                    <a:lstStyle/>
+                    <a:p>
+                      <a:pPr fontAlgn="t"/>
+                      <a:r>
+                        <a:rPr lang="en-US" dirty="0">
+                          <a:effectLst/>
+                        </a:rPr>
+                        <a:t>Metadata less flexible than TIFF, RGB only</a:t>
+                      </a:r>
+                    </a:p>
+                  </a:txBody>
+                  <a:tcPr marL="76200" marR="76200" marT="76200" marB="76200"/>
+                </a:tc>
+                <a:extLst>
+                  <a:ext uri="{0D108BD9-81ED-4DB2-BD59-A6C34878D82A}">
+                    <a16:rowId xmlns:a16="http://schemas.microsoft.com/office/drawing/2014/main" val="651443914"/>
+                  </a:ext>
+                </a:extLst>
+              </a:tr>
+              <a:tr h="912384">
+                <a:tc>
+                  <a:txBody>
+                    <a:bodyPr/>
+                    <a:lstStyle/>
+                    <a:p>
+                      <a:pPr fontAlgn="t"/>
+                      <a:r>
+                        <a:rPr lang="en-US" dirty="0">
+                          <a:effectLst/>
+                        </a:rPr>
+                        <a:t>TIFF</a:t>
+                      </a:r>
+                    </a:p>
+                  </a:txBody>
+                  <a:tcPr marL="76200" marR="76200" marT="76200" marB="76200"/>
+                </a:tc>
+                <a:tc>
+                  <a:txBody>
+                    <a:bodyPr/>
+                    <a:lstStyle/>
+                    <a:p>
+                      <a:pPr fontAlgn="t"/>
+                      <a:r>
+                        <a:rPr lang="en-US" dirty="0">
+                          <a:effectLst/>
+                        </a:rPr>
+                        <a:t>None, lossy, </a:t>
+                      </a:r>
+                      <a:r>
+                        <a:rPr lang="en-US" sz="1800" b="0" i="0" u="none" strike="noStrike" noProof="0" dirty="0">
+                          <a:effectLst/>
+                          <a:latin typeface="Arial"/>
+                        </a:rPr>
+                        <a:t>or lossless</a:t>
+                      </a:r>
+                      <a:endParaRPr lang="en-US" dirty="0">
+                        <a:effectLst/>
+                      </a:endParaRPr>
+                    </a:p>
+                  </a:txBody>
+                  <a:tcPr marL="76200" marR="76200" marT="76200" marB="76200"/>
+                </a:tc>
+                <a:tc>
+                  <a:txBody>
+                    <a:bodyPr/>
+                    <a:lstStyle/>
+                    <a:p>
+                      <a:pPr fontAlgn="t"/>
+                      <a:r>
+                        <a:rPr lang="en-US" dirty="0">
+                          <a:effectLst/>
+                        </a:rPr>
+                        <a:t>Yes</a:t>
+                      </a:r>
+                    </a:p>
+                  </a:txBody>
+                  <a:tcPr marL="76200" marR="76200" marT="76200" marB="76200"/>
+                </a:tc>
+                <a:tc>
+                  <a:txBody>
+                    <a:bodyPr/>
+                    <a:lstStyle/>
+                    <a:p>
+                      <a:pPr fontAlgn="t"/>
+                      <a:r>
+                        <a:rPr lang="en-US" dirty="0">
+                          <a:effectLst/>
+                        </a:rPr>
+                        <a:t>High quality or </a:t>
+                      </a:r>
+                      <a:r>
+                        <a:rPr lang="en-US" sz="1800" b="0" i="0" u="none" strike="noStrike" noProof="0" dirty="0">
+                          <a:effectLst/>
+                          <a:latin typeface="Arial"/>
+                        </a:rPr>
+                        <a:t>smaller file size</a:t>
+                      </a:r>
+                      <a:endParaRPr lang="en-US" dirty="0">
+                        <a:effectLst/>
+                      </a:endParaRPr>
+                    </a:p>
+                  </a:txBody>
+                  <a:tcPr marL="76200" marR="76200" marT="76200" marB="76200"/>
+                </a:tc>
+                <a:tc>
+                  <a:txBody>
+                    <a:bodyPr/>
+                    <a:lstStyle/>
+                    <a:p>
+                      <a:pPr fontAlgn="t"/>
+                      <a:r>
+                        <a:rPr lang="en-US" dirty="0">
+                          <a:effectLst/>
+                        </a:rPr>
+                        <a:t>Not universally viewable</a:t>
+                      </a:r>
+                    </a:p>
+                  </a:txBody>
+                  <a:tcPr marL="76200" marR="76200" marT="76200" marB="76200"/>
+                </a:tc>
+                <a:extLst>
+                  <a:ext uri="{0D108BD9-81ED-4DB2-BD59-A6C34878D82A}">
+                    <a16:rowId xmlns:a16="http://schemas.microsoft.com/office/drawing/2014/main" val="2157659170"/>
+                  </a:ext>
+                </a:extLst>
+              </a:tr>
+            </a:tbl>
+          </a:graphicData>
+        </a:graphic>
+      </p:graphicFrame>
+      <p:sp>
+        <p:nvSpPr>
+          <p:cNvPr id="2" name="TextBox 1">
+            <a:extLst>
+              <a:ext uri="{FF2B5EF4-FFF2-40B4-BE49-F238E27FC236}">
+                <a16:creationId xmlns:a16="http://schemas.microsoft.com/office/drawing/2014/main" id="{0808CEDD-8017-9C80-1284-D3AD3F9A04A4}"/>
+              </a:ext>
+            </a:extLst>
+          </p:cNvPr>
+          <p:cNvSpPr txBox="1"/>
+          <p:nvPr/>
+        </p:nvSpPr>
+        <p:spPr>
+          <a:xfrm>
+            <a:off x="700216" y="2100649"/>
+            <a:ext cx="1276865" cy="2862322"/>
+          </a:xfrm>
+          <a:prstGeom prst="rect">
+            <a:avLst/>
+          </a:prstGeom>
+          <a:noFill/>
+        </p:spPr>
+        <p:txBody>
+          <a:bodyPr wrap="square" rtlCol="0">
+            <a:spAutoFit/>
+          </a:bodyPr>
+          <a:lstStyle/>
+          <a:p>
+            <a:r>
+              <a:rPr lang="en-US" dirty="0"/>
+              <a:t>Let’s </a:t>
+            </a:r>
+          </a:p>
+          <a:p>
+            <a:r>
+              <a:rPr lang="en-US" dirty="0"/>
+              <a:t>live </a:t>
+            </a:r>
+          </a:p>
+          <a:p>
+            <a:r>
+              <a:rPr lang="en-US" dirty="0"/>
+              <a:t>in </a:t>
+            </a:r>
+          </a:p>
+          <a:p>
+            <a:r>
+              <a:rPr lang="en-US" dirty="0"/>
+              <a:t>reality!</a:t>
+            </a:r>
+          </a:p>
+          <a:p>
+            <a:endParaRPr lang="en-US" dirty="0"/>
+          </a:p>
+          <a:p>
+            <a:endParaRPr lang="en-US" dirty="0"/>
+          </a:p>
+          <a:p>
+            <a:r>
+              <a:rPr lang="en-US" dirty="0"/>
+              <a:t>Let’s always keep learning!</a:t>
+            </a:r>
+            <a:endParaRPr lang="en-NL" dirty="0"/>
+          </a:p>
+        </p:txBody>
+      </p:sp>
+    </p:spTree>
+    <p:extLst>
+      <p:ext uri="{BB962C8B-B14F-4D97-AF65-F5344CB8AC3E}">
+        <p14:creationId xmlns:p14="http://schemas.microsoft.com/office/powerpoint/2010/main" val="3266811571"/>
+      </p:ext>
+    </p:extLst>
+  </p:cSld>
+  <p:clrMapOvr>
+    <a:masterClrMapping/>
+  </p:clrMapOvr>
+  <p:timing>
+    <p:tnLst>
+      <p:par>
+        <p:cTn id="1" dur="indefinite" restart="never" nodeType="tmRoot">
+          <p:childTnLst>
+            <p:seq concurrent="1" nextAc="seek">
+              <p:cTn id="2" dur="indefinite" nodeType="mainSeq">
+                <p:childTnLst>
+                  <p:par>
+                    <p:cTn id="3" fill="hold">
+                      <p:stCondLst>
+                        <p:cond delay="indefinite"/>
+                      </p:stCondLst>
+                      <p:childTnLst>
+                        <p:par>
+                          <p:cTn id="4" fill="hold">
+                            <p:stCondLst>
+                              <p:cond delay="0"/>
+                            </p:stCondLst>
+                            <p:childTnLst>
+                              <p:par>
+                                <p:cTn id="5" presetID="1" presetClass="entr" presetSubtype="0" fill="hold" grpId="0" nodeType="clickEffect" nodePh="1">
+                                  <p:stCondLst>
+                                    <p:cond delay="0"/>
+                                  </p:stCondLst>
+                                  <p:endCondLst>
+                                    <p:cond evt="begin" delay="0">
+                                      <p:tn val="5"/>
+                                    </p:cond>
+                                  </p:endCondLst>
+                                  <p:childTnLst>
+                                    <p:set>
+                                      <p:cBhvr>
+                                        <p:cTn id="6" dur="1" fill="hold">
+                                          <p:stCondLst>
+                                            <p:cond delay="0"/>
+                                          </p:stCondLst>
+                                        </p:cTn>
+                                        <p:tgtEl>
+                                          <p:spTgt spid="6"/>
+                                        </p:tgtEl>
+                                        <p:attrNameLst>
+                                          <p:attrName>style.visibility</p:attrName>
+                                        </p:attrNameLst>
+                                      </p:cBhvr>
+                                      <p:to>
+                                        <p:strVal val="visible"/>
+                                      </p:to>
+                                    </p:set>
+                                  </p:childTnLst>
+                                </p:cTn>
+                              </p:par>
+                            </p:childTnLst>
+                          </p:cTn>
+                        </p:par>
+                      </p:childTnLst>
+                    </p:cTn>
+                  </p:par>
+                </p:childTnLst>
+              </p:cTn>
+              <p:prevCondLst>
+                <p:cond evt="onPrev" delay="0">
+                  <p:tgtEl>
+                    <p:sldTgt/>
+                  </p:tgtEl>
+                </p:cond>
+              </p:prevCondLst>
+              <p:nextCondLst>
+                <p:cond evt="onNext" delay="0">
+                  <p:tgtEl>
+                    <p:sldTgt/>
+                  </p:tgtEl>
+                </p:cond>
+              </p:nextCondLst>
+            </p:seq>
+          </p:childTnLst>
+        </p:cTn>
+      </p:par>
+    </p:tnLst>
+    <p:bldLst>
+      <p:bldP spid="6" grpId="0"/>
+    </p:bldLst>
+  </p:timing>
 </p:sld>
 </file>
 

</xml_diff>